<commit_message>
Minor updates to notes and presentations
Minor updates to notes and presentations
</commit_message>
<xml_diff>
--- a/CSharpProgramming/Presentations/OOProgPartIII/Proxy.pptx
+++ b/CSharpProgramming/Presentations/OOProgPartIII/Proxy.pptx
@@ -269,7 +269,7 @@
           <a:p>
             <a:fld id="{E15B7D8E-2A20-4C0E-991C-872DBB7459A8}" type="datetimeFigureOut">
               <a:rPr lang="da-DK" smtClean="0"/>
-              <a:t>08-04-2018</a:t>
+              <a:t>11-04-2018</a:t>
             </a:fld>
             <a:endParaRPr lang="da-DK"/>
           </a:p>
@@ -439,7 +439,7 @@
           <a:p>
             <a:fld id="{E15B7D8E-2A20-4C0E-991C-872DBB7459A8}" type="datetimeFigureOut">
               <a:rPr lang="da-DK" smtClean="0"/>
-              <a:t>08-04-2018</a:t>
+              <a:t>11-04-2018</a:t>
             </a:fld>
             <a:endParaRPr lang="da-DK"/>
           </a:p>
@@ -619,7 +619,7 @@
           <a:p>
             <a:fld id="{E15B7D8E-2A20-4C0E-991C-872DBB7459A8}" type="datetimeFigureOut">
               <a:rPr lang="da-DK" smtClean="0"/>
-              <a:t>08-04-2018</a:t>
+              <a:t>11-04-2018</a:t>
             </a:fld>
             <a:endParaRPr lang="da-DK"/>
           </a:p>
@@ -789,7 +789,7 @@
           <a:p>
             <a:fld id="{E15B7D8E-2A20-4C0E-991C-872DBB7459A8}" type="datetimeFigureOut">
               <a:rPr lang="da-DK" smtClean="0"/>
-              <a:t>08-04-2018</a:t>
+              <a:t>11-04-2018</a:t>
             </a:fld>
             <a:endParaRPr lang="da-DK"/>
           </a:p>
@@ -1035,7 +1035,7 @@
           <a:p>
             <a:fld id="{E15B7D8E-2A20-4C0E-991C-872DBB7459A8}" type="datetimeFigureOut">
               <a:rPr lang="da-DK" smtClean="0"/>
-              <a:t>08-04-2018</a:t>
+              <a:t>11-04-2018</a:t>
             </a:fld>
             <a:endParaRPr lang="da-DK"/>
           </a:p>
@@ -1267,7 +1267,7 @@
           <a:p>
             <a:fld id="{E15B7D8E-2A20-4C0E-991C-872DBB7459A8}" type="datetimeFigureOut">
               <a:rPr lang="da-DK" smtClean="0"/>
-              <a:t>08-04-2018</a:t>
+              <a:t>11-04-2018</a:t>
             </a:fld>
             <a:endParaRPr lang="da-DK"/>
           </a:p>
@@ -1634,7 +1634,7 @@
           <a:p>
             <a:fld id="{E15B7D8E-2A20-4C0E-991C-872DBB7459A8}" type="datetimeFigureOut">
               <a:rPr lang="da-DK" smtClean="0"/>
-              <a:t>08-04-2018</a:t>
+              <a:t>11-04-2018</a:t>
             </a:fld>
             <a:endParaRPr lang="da-DK"/>
           </a:p>
@@ -1752,7 +1752,7 @@
           <a:p>
             <a:fld id="{E15B7D8E-2A20-4C0E-991C-872DBB7459A8}" type="datetimeFigureOut">
               <a:rPr lang="da-DK" smtClean="0"/>
-              <a:t>08-04-2018</a:t>
+              <a:t>11-04-2018</a:t>
             </a:fld>
             <a:endParaRPr lang="da-DK"/>
           </a:p>
@@ -1847,7 +1847,7 @@
           <a:p>
             <a:fld id="{E15B7D8E-2A20-4C0E-991C-872DBB7459A8}" type="datetimeFigureOut">
               <a:rPr lang="da-DK" smtClean="0"/>
-              <a:t>08-04-2018</a:t>
+              <a:t>11-04-2018</a:t>
             </a:fld>
             <a:endParaRPr lang="da-DK"/>
           </a:p>
@@ -2124,7 +2124,7 @@
           <a:p>
             <a:fld id="{E15B7D8E-2A20-4C0E-991C-872DBB7459A8}" type="datetimeFigureOut">
               <a:rPr lang="da-DK" smtClean="0"/>
-              <a:t>08-04-2018</a:t>
+              <a:t>11-04-2018</a:t>
             </a:fld>
             <a:endParaRPr lang="da-DK"/>
           </a:p>
@@ -2377,7 +2377,7 @@
           <a:p>
             <a:fld id="{E15B7D8E-2A20-4C0E-991C-872DBB7459A8}" type="datetimeFigureOut">
               <a:rPr lang="da-DK" smtClean="0"/>
-              <a:t>08-04-2018</a:t>
+              <a:t>11-04-2018</a:t>
             </a:fld>
             <a:endParaRPr lang="da-DK"/>
           </a:p>
@@ -2590,7 +2590,7 @@
           <a:p>
             <a:fld id="{E15B7D8E-2A20-4C0E-991C-872DBB7459A8}" type="datetimeFigureOut">
               <a:rPr lang="da-DK" smtClean="0"/>
-              <a:t>08-04-2018</a:t>
+              <a:t>11-04-2018</a:t>
             </a:fld>
             <a:endParaRPr lang="da-DK"/>
           </a:p>
@@ -3021,10 +3021,6 @@
               <a:rPr lang="da-DK" sz="9600" smtClean="0"/>
               <a:t>Proxy</a:t>
             </a:r>
-            <a:r>
-              <a:rPr lang="da-DK" sz="9600" smtClean="0"/>
-              <a:t/>
-            </a:r>
             <a:br>
               <a:rPr lang="da-DK" sz="9600" smtClean="0"/>
             </a:br>
@@ -3607,11 +3603,6 @@
               </a:rPr>
               <a:t>ISubject</a:t>
             </a:r>
-            <a:endParaRPr lang="da-DK" sz="3600" smtClean="0">
-              <a:solidFill>
-                <a:srgbClr val="FFFF00"/>
-              </a:solidFill>
-            </a:endParaRPr>
           </a:p>
         </p:txBody>
       </p:sp>
@@ -3698,7 +3689,6 @@
               <a:rPr lang="da-DK" sz="3600" smtClean="0"/>
               <a:t>Subject</a:t>
             </a:r>
-            <a:endParaRPr lang="da-DK" sz="3600" smtClean="0"/>
           </a:p>
         </p:txBody>
       </p:sp>
@@ -3915,7 +3905,6 @@
               <a:rPr lang="da-DK" sz="3600" smtClean="0"/>
               <a:t>Subject</a:t>
             </a:r>
-            <a:endParaRPr lang="da-DK" sz="3600" smtClean="0"/>
           </a:p>
         </p:txBody>
       </p:sp>
@@ -3968,11 +3957,6 @@
               </a:rPr>
               <a:t>ISubject</a:t>
             </a:r>
-            <a:endParaRPr lang="da-DK" sz="3600" smtClean="0">
-              <a:solidFill>
-                <a:srgbClr val="FFFF00"/>
-              </a:solidFill>
-            </a:endParaRPr>
           </a:p>
         </p:txBody>
       </p:sp>
@@ -4072,8 +4056,11 @@
           </a:prstGeom>
           <a:ln w="76200">
             <a:solidFill>
-              <a:schemeClr val="tx1"/>
+              <a:schemeClr val="bg1">
+                <a:lumMod val="50000"/>
+              </a:schemeClr>
             </a:solidFill>
+            <a:prstDash val="sysDot"/>
             <a:headEnd w="lg" len="lg"/>
             <a:tailEnd type="arrow" w="lg" len="lg"/>
           </a:ln>
@@ -4154,11 +4141,6 @@
               </a:rPr>
               <a:t>Simple</a:t>
             </a:r>
-            <a:endParaRPr lang="da-DK" sz="3600" smtClean="0">
-              <a:solidFill>
-                <a:srgbClr val="FFFF00"/>
-              </a:solidFill>
-            </a:endParaRPr>
           </a:p>
         </p:txBody>
       </p:sp>
@@ -4212,13 +4194,13 @@
   <p:clrMapOvr>
     <a:masterClrMapping/>
   </p:clrMapOvr>
-  <mc:AlternateContent xmlns:mc="http://schemas.openxmlformats.org/markup-compatibility/2006">
-    <mc:Choice xmlns:p14="http://schemas.microsoft.com/office/powerpoint/2010/main" Requires="p14">
+  <mc:AlternateContent xmlns:mc="http://schemas.openxmlformats.org/markup-compatibility/2006" xmlns:p14="http://schemas.microsoft.com/office/powerpoint/2010/main">
+    <mc:Choice Requires="p14">
       <p:transition spd="med" p14:dur="700">
         <p:fade/>
       </p:transition>
     </mc:Choice>
-    <mc:Fallback>
+    <mc:Fallback xmlns="">
       <p:transition spd="med">
         <p:fade/>
       </p:transition>
@@ -4477,16 +4459,7 @@
                 </a:solidFill>
                 <a:latin typeface="Consolas" panose="020B0609020204030204" pitchFamily="49" charset="0"/>
               </a:rPr>
-              <a:t>public </a:t>
-            </a:r>
-            <a:r>
-              <a:rPr lang="da-DK" sz="2000" b="1">
-                <a:solidFill>
-                  <a:srgbClr val="0070C0"/>
-                </a:solidFill>
-                <a:latin typeface="Consolas" panose="020B0609020204030204" pitchFamily="49" charset="0"/>
-              </a:rPr>
-              <a:t>int </a:t>
+              <a:t>public int </a:t>
             </a:r>
             <a:r>
               <a:rPr lang="da-DK" sz="2000" b="1">
@@ -4509,13 +4482,7 @@
               <a:rPr lang="da-DK" sz="2000" b="1">
                 <a:latin typeface="Consolas" panose="020B0609020204030204" pitchFamily="49" charset="0"/>
               </a:rPr>
-              <a:t> </a:t>
-            </a:r>
-            <a:r>
-              <a:rPr lang="da-DK" sz="2000" b="1">
-                <a:latin typeface="Consolas" panose="020B0609020204030204" pitchFamily="49" charset="0"/>
-              </a:rPr>
-              <a:t>c</a:t>
+              <a:t> c</a:t>
             </a:r>
             <a:r>
               <a:rPr lang="da-DK" sz="2000" b="1" smtClean="0">
@@ -5263,7 +5230,6 @@
               <a:rPr lang="da-DK" sz="3600" smtClean="0"/>
               <a:t>Subject</a:t>
             </a:r>
-            <a:endParaRPr lang="da-DK" sz="3600" smtClean="0"/>
           </a:p>
         </p:txBody>
       </p:sp>
@@ -5316,11 +5282,6 @@
               </a:rPr>
               <a:t>ISubject</a:t>
             </a:r>
-            <a:endParaRPr lang="da-DK" sz="3600" smtClean="0">
-              <a:solidFill>
-                <a:srgbClr val="FFFF00"/>
-              </a:solidFill>
-            </a:endParaRPr>
           </a:p>
         </p:txBody>
       </p:sp>
@@ -5420,8 +5381,11 @@
           </a:prstGeom>
           <a:ln w="76200">
             <a:solidFill>
-              <a:schemeClr val="tx1"/>
+              <a:schemeClr val="bg1">
+                <a:lumMod val="50000"/>
+              </a:schemeClr>
             </a:solidFill>
+            <a:prstDash val="sysDot"/>
             <a:headEnd w="lg" len="lg"/>
             <a:tailEnd type="arrow" w="lg" len="lg"/>
           </a:ln>
@@ -5502,11 +5466,6 @@
               </a:rPr>
               <a:t>Simple</a:t>
             </a:r>
-            <a:endParaRPr lang="da-DK" sz="3600" smtClean="0">
-              <a:solidFill>
-                <a:srgbClr val="FFFF00"/>
-              </a:solidFill>
-            </a:endParaRPr>
           </a:p>
         </p:txBody>
       </p:sp>
@@ -5723,7 +5682,6 @@
               <a:rPr lang="da-DK" sz="3600" smtClean="0"/>
               <a:t>Subject</a:t>
             </a:r>
-            <a:endParaRPr lang="da-DK" sz="3600" smtClean="0"/>
           </a:p>
         </p:txBody>
       </p:sp>
@@ -5776,11 +5734,6 @@
               </a:rPr>
               <a:t>ISubject</a:t>
             </a:r>
-            <a:endParaRPr lang="da-DK" sz="3600" smtClean="0">
-              <a:solidFill>
-                <a:srgbClr val="FFFF00"/>
-              </a:solidFill>
-            </a:endParaRPr>
           </a:p>
         </p:txBody>
       </p:sp>
@@ -5880,8 +5833,11 @@
           </a:prstGeom>
           <a:ln w="76200">
             <a:solidFill>
-              <a:schemeClr val="tx1"/>
+              <a:schemeClr val="bg1">
+                <a:lumMod val="50000"/>
+              </a:schemeClr>
             </a:solidFill>
+            <a:prstDash val="sysDot"/>
             <a:headEnd w="lg" len="lg"/>
             <a:tailEnd type="arrow" w="lg" len="lg"/>
           </a:ln>
@@ -5962,11 +5918,6 @@
               </a:rPr>
               <a:t>Simple</a:t>
             </a:r>
-            <a:endParaRPr lang="da-DK" sz="3600" smtClean="0">
-              <a:solidFill>
-                <a:srgbClr val="FFFF00"/>
-              </a:solidFill>
-            </a:endParaRPr>
           </a:p>
         </p:txBody>
       </p:sp>
@@ -6023,13 +5974,13 @@
   <p:clrMapOvr>
     <a:masterClrMapping/>
   </p:clrMapOvr>
-  <mc:AlternateContent xmlns:mc="http://schemas.openxmlformats.org/markup-compatibility/2006">
-    <mc:Choice xmlns:p14="http://schemas.microsoft.com/office/powerpoint/2010/main" Requires="p14">
+  <mc:AlternateContent xmlns:mc="http://schemas.openxmlformats.org/markup-compatibility/2006" xmlns:p14="http://schemas.microsoft.com/office/powerpoint/2010/main">
+    <mc:Choice Requires="p14">
       <p:transition spd="med" p14:dur="700">
         <p:fade/>
       </p:transition>
     </mc:Choice>
-    <mc:Fallback>
+    <mc:Fallback xmlns="">
       <p:transition spd="med">
         <p:fade/>
       </p:transition>
@@ -6135,11 +6086,7 @@
             </a:r>
             <a:r>
               <a:rPr lang="da-DK" sz="3200"/>
-              <a:t> </a:t>
-            </a:r>
-            <a:r>
-              <a:rPr lang="da-DK" sz="3200"/>
-              <a:t>to </a:t>
+              <a:t> to </a:t>
             </a:r>
             <a:r>
               <a:rPr lang="da-DK" sz="3200" b="1" smtClean="0"/>
@@ -6712,13 +6659,7 @@
               <a:rPr lang="da-DK" sz="1600" b="1">
                 <a:latin typeface="Consolas" panose="020B0609020204030204" pitchFamily="49" charset="0"/>
               </a:rPr>
-              <a:t>subject </a:t>
-            </a:r>
-            <a:r>
-              <a:rPr lang="da-DK" sz="1600" b="1">
-                <a:latin typeface="Consolas" panose="020B0609020204030204" pitchFamily="49" charset="0"/>
-              </a:rPr>
-              <a:t>= </a:t>
+              <a:t>subject = </a:t>
             </a:r>
             <a:r>
               <a:rPr lang="da-DK" sz="1600" b="1" smtClean="0">
@@ -6769,16 +6710,7 @@
                 </a:solidFill>
                 <a:latin typeface="Consolas" panose="020B0609020204030204" pitchFamily="49" charset="0"/>
               </a:rPr>
-              <a:t>public </a:t>
-            </a:r>
-            <a:r>
-              <a:rPr lang="da-DK" sz="1600" b="1">
-                <a:solidFill>
-                  <a:srgbClr val="0070C0"/>
-                </a:solidFill>
-                <a:latin typeface="Consolas" panose="020B0609020204030204" pitchFamily="49" charset="0"/>
-              </a:rPr>
-              <a:t>int </a:t>
+              <a:t>public int </a:t>
             </a:r>
             <a:r>
               <a:rPr lang="da-DK" sz="1600" b="1">
@@ -6801,13 +6733,7 @@
               <a:rPr lang="da-DK" sz="1600" b="1">
                 <a:latin typeface="Consolas" panose="020B0609020204030204" pitchFamily="49" charset="0"/>
               </a:rPr>
-              <a:t> </a:t>
-            </a:r>
-            <a:r>
-              <a:rPr lang="da-DK" sz="1600" b="1">
-                <a:latin typeface="Consolas" panose="020B0609020204030204" pitchFamily="49" charset="0"/>
-              </a:rPr>
-              <a:t>c</a:t>
+              <a:t> c</a:t>
             </a:r>
             <a:r>
               <a:rPr lang="da-DK" sz="1600" b="1" smtClean="0">
@@ -6989,10 +6915,10 @@
                 </a:solidFill>
                 <a:latin typeface="Consolas" panose="020B0609020204030204" pitchFamily="49" charset="0"/>
               </a:rPr>
-              <a:t> </a:t>
-            </a:r>
-            <a:r>
-              <a:rPr lang="da-DK" sz="1600" b="1">
+              <a:t> // </a:t>
+            </a:r>
+            <a:r>
+              <a:rPr lang="da-DK" sz="1600" b="1" smtClean="0">
                 <a:solidFill>
                   <a:schemeClr val="accent6">
                     <a:lumMod val="75000"/>
@@ -7000,17 +6926,6 @@
                 </a:solidFill>
                 <a:latin typeface="Consolas" panose="020B0609020204030204" pitchFamily="49" charset="0"/>
               </a:rPr>
-              <a:t>// </a:t>
-            </a:r>
-            <a:r>
-              <a:rPr lang="da-DK" sz="1600" b="1" smtClean="0">
-                <a:solidFill>
-                  <a:schemeClr val="accent6">
-                    <a:lumMod val="75000"/>
-                  </a:schemeClr>
-                </a:solidFill>
-                <a:latin typeface="Consolas" panose="020B0609020204030204" pitchFamily="49" charset="0"/>
-              </a:rPr>
               <a:t>Or use Factory…</a:t>
             </a:r>
             <a:endParaRPr lang="da-DK" sz="1600" b="1">
@@ -7024,9 +6939,6 @@
               </a:rPr>
               <a:t>   }</a:t>
             </a:r>
-            <a:endParaRPr lang="da-DK" sz="1600" b="1">
-              <a:latin typeface="Consolas" panose="020B0609020204030204" pitchFamily="49" charset="0"/>
-            </a:endParaRPr>
           </a:p>
           <a:p>
             <a:r>
@@ -7140,17 +7052,12 @@
             <a:pPr lvl="1"/>
             <a:r>
               <a:rPr lang="da-DK" sz="2800" smtClean="0"/>
-              <a:t>We want to use the </a:t>
-            </a:r>
-            <a:r>
-              <a:rPr lang="da-DK" sz="2800" smtClean="0"/>
-              <a:t>functionality offered by a class </a:t>
+              <a:t>We want to use the functionality offered by a class </a:t>
             </a:r>
             <a:r>
               <a:rPr lang="da-DK" sz="2800" b="1" smtClean="0"/>
               <a:t>Subject</a:t>
             </a:r>
-            <a:endParaRPr lang="da-DK" sz="2800" b="1" smtClean="0"/>
           </a:p>
           <a:p>
             <a:pPr lvl="1"/>
@@ -7215,7 +7122,6 @@
               <a:rPr lang="da-DK" sz="4800" smtClean="0"/>
               <a:t>Client</a:t>
             </a:r>
-            <a:endParaRPr lang="da-DK" sz="4800" smtClean="0"/>
           </a:p>
         </p:txBody>
       </p:sp>
@@ -7262,7 +7168,6 @@
               <a:rPr lang="da-DK" sz="4800" smtClean="0"/>
               <a:t>Subject</a:t>
             </a:r>
-            <a:endParaRPr lang="da-DK" sz="4800" smtClean="0"/>
           </a:p>
         </p:txBody>
       </p:sp>
@@ -8195,13 +8100,7 @@
               <a:rPr lang="da-DK" sz="1400" b="1">
                 <a:latin typeface="Consolas" panose="020B0609020204030204" pitchFamily="49" charset="0"/>
               </a:rPr>
-              <a:t> _</a:t>
-            </a:r>
-            <a:r>
-              <a:rPr lang="da-DK" sz="1400" b="1">
-                <a:latin typeface="Consolas" panose="020B0609020204030204" pitchFamily="49" charset="0"/>
-              </a:rPr>
-              <a:t>subject</a:t>
+              <a:t> _subject</a:t>
             </a:r>
             <a:r>
               <a:rPr lang="da-DK" sz="1400" b="1" smtClean="0">
@@ -8279,16 +8178,7 @@
                 </a:solidFill>
                 <a:latin typeface="Consolas" panose="020B0609020204030204" pitchFamily="49" charset="0"/>
               </a:rPr>
-              <a:t> </a:t>
-            </a:r>
-            <a:r>
-              <a:rPr lang="da-DK" sz="1400" b="1" smtClean="0">
-                <a:solidFill>
-                  <a:srgbClr val="0070C0"/>
-                </a:solidFill>
-                <a:latin typeface="Consolas" panose="020B0609020204030204" pitchFamily="49" charset="0"/>
-              </a:rPr>
-              <a:t>int</a:t>
+              <a:t> int</a:t>
             </a:r>
             <a:r>
               <a:rPr lang="da-DK" sz="1400" b="1" smtClean="0">
@@ -8425,16 +8315,7 @@
                 </a:solidFill>
                 <a:latin typeface="Consolas" panose="020B0609020204030204" pitchFamily="49" charset="0"/>
               </a:rPr>
-              <a:t> </a:t>
-            </a:r>
-            <a:r>
-              <a:rPr lang="da-DK" sz="1400" b="1">
-                <a:solidFill>
-                  <a:srgbClr val="0070C0"/>
-                </a:solidFill>
-                <a:latin typeface="Consolas" panose="020B0609020204030204" pitchFamily="49" charset="0"/>
-              </a:rPr>
-              <a:t>int</a:t>
+              <a:t> int</a:t>
             </a:r>
             <a:r>
               <a:rPr lang="da-DK" sz="1400" b="1" smtClean="0">
@@ -8457,13 +8338,7 @@
               <a:rPr lang="da-DK" sz="1400" b="1">
                 <a:latin typeface="Consolas" panose="020B0609020204030204" pitchFamily="49" charset="0"/>
               </a:rPr>
-              <a:t>subject </a:t>
-            </a:r>
-            <a:r>
-              <a:rPr lang="da-DK" sz="1400" b="1">
-                <a:latin typeface="Consolas" panose="020B0609020204030204" pitchFamily="49" charset="0"/>
-              </a:rPr>
-              <a:t>= </a:t>
+              <a:t>subject = </a:t>
             </a:r>
             <a:r>
               <a:rPr lang="da-DK" sz="1400" b="1" smtClean="0">
@@ -8505,16 +8380,7 @@
                 </a:solidFill>
                 <a:latin typeface="Consolas" panose="020B0609020204030204" pitchFamily="49" charset="0"/>
               </a:rPr>
-              <a:t>public </a:t>
-            </a:r>
-            <a:r>
-              <a:rPr lang="da-DK" sz="1400" b="1">
-                <a:solidFill>
-                  <a:srgbClr val="0070C0"/>
-                </a:solidFill>
-                <a:latin typeface="Consolas" panose="020B0609020204030204" pitchFamily="49" charset="0"/>
-              </a:rPr>
-              <a:t>int </a:t>
+              <a:t>public int </a:t>
             </a:r>
             <a:r>
               <a:rPr lang="da-DK" sz="1400" b="1">
@@ -8537,77 +8403,56 @@
               <a:rPr lang="da-DK" sz="1400" b="1">
                 <a:latin typeface="Consolas" panose="020B0609020204030204" pitchFamily="49" charset="0"/>
               </a:rPr>
+              <a:t> c</a:t>
+            </a:r>
+            <a:r>
+              <a:rPr lang="da-DK" sz="1400" b="1" smtClean="0">
+                <a:latin typeface="Consolas" panose="020B0609020204030204" pitchFamily="49" charset="0"/>
+              </a:rPr>
+              <a:t>)</a:t>
+            </a:r>
+          </a:p>
+          <a:p>
+            <a:r>
+              <a:rPr lang="da-DK" sz="1400" b="1">
+                <a:latin typeface="Consolas" panose="020B0609020204030204" pitchFamily="49" charset="0"/>
+              </a:rPr>
               <a:t> </a:t>
             </a:r>
             <a:r>
+              <a:rPr lang="da-DK" sz="1400" b="1" smtClean="0">
+                <a:latin typeface="Consolas" panose="020B0609020204030204" pitchFamily="49" charset="0"/>
+              </a:rPr>
+              <a:t>  {</a:t>
+            </a:r>
+          </a:p>
+          <a:p>
+            <a:r>
+              <a:rPr lang="da-DK" sz="1400" b="1" smtClean="0">
+                <a:latin typeface="Consolas" panose="020B0609020204030204" pitchFamily="49" charset="0"/>
+              </a:rPr>
+              <a:t>      </a:t>
+            </a:r>
+            <a:r>
               <a:rPr lang="da-DK" sz="1400" b="1">
-                <a:latin typeface="Consolas" panose="020B0609020204030204" pitchFamily="49" charset="0"/>
-              </a:rPr>
-              <a:t>c</a:t>
+                <a:solidFill>
+                  <a:srgbClr val="0070C0"/>
+                </a:solidFill>
+                <a:latin typeface="Consolas" panose="020B0609020204030204" pitchFamily="49" charset="0"/>
+              </a:rPr>
+              <a:t>if</a:t>
             </a:r>
             <a:r>
               <a:rPr lang="da-DK" sz="1400" b="1" smtClean="0">
                 <a:latin typeface="Consolas" panose="020B0609020204030204" pitchFamily="49" charset="0"/>
               </a:rPr>
-              <a:t>)</a:t>
-            </a:r>
-          </a:p>
-          <a:p>
+              <a:t> </a:t>
+            </a:r>
             <a:r>
               <a:rPr lang="da-DK" sz="1400" b="1">
                 <a:latin typeface="Consolas" panose="020B0609020204030204" pitchFamily="49" charset="0"/>
               </a:rPr>
-              <a:t> </a:t>
-            </a:r>
-            <a:r>
-              <a:rPr lang="da-DK" sz="1400" b="1" smtClean="0">
-                <a:latin typeface="Consolas" panose="020B0609020204030204" pitchFamily="49" charset="0"/>
-              </a:rPr>
-              <a:t>  {</a:t>
-            </a:r>
-          </a:p>
-          <a:p>
-            <a:r>
-              <a:rPr lang="da-DK" sz="1400" b="1" smtClean="0">
-                <a:latin typeface="Consolas" panose="020B0609020204030204" pitchFamily="49" charset="0"/>
-              </a:rPr>
-              <a:t>      </a:t>
-            </a:r>
-            <a:r>
-              <a:rPr lang="da-DK" sz="1400" b="1">
-                <a:solidFill>
-                  <a:srgbClr val="0070C0"/>
-                </a:solidFill>
-                <a:latin typeface="Consolas" panose="020B0609020204030204" pitchFamily="49" charset="0"/>
-              </a:rPr>
-              <a:t>i</a:t>
-            </a:r>
-            <a:r>
-              <a:rPr lang="da-DK" sz="1400" b="1">
-                <a:solidFill>
-                  <a:srgbClr val="0070C0"/>
-                </a:solidFill>
-                <a:latin typeface="Consolas" panose="020B0609020204030204" pitchFamily="49" charset="0"/>
-              </a:rPr>
-              <a:t>f</a:t>
-            </a:r>
-            <a:r>
-              <a:rPr lang="da-DK" sz="1400" b="1" smtClean="0">
-                <a:latin typeface="Consolas" panose="020B0609020204030204" pitchFamily="49" charset="0"/>
-              </a:rPr>
-              <a:t> </a:t>
-            </a:r>
-            <a:r>
-              <a:rPr lang="da-DK" sz="1400" b="1">
-                <a:latin typeface="Consolas" panose="020B0609020204030204" pitchFamily="49" charset="0"/>
-              </a:rPr>
-              <a:t>(!_</a:t>
-            </a:r>
-            <a:r>
-              <a:rPr lang="da-DK" sz="1400" b="1">
-                <a:latin typeface="Consolas" panose="020B0609020204030204" pitchFamily="49" charset="0"/>
-              </a:rPr>
-              <a:t>cache.ContainsKey(c</a:t>
+              <a:t>(!_cache.ContainsKey(c</a:t>
             </a:r>
             <a:r>
               <a:rPr lang="da-DK" sz="1400" b="1" smtClean="0">
@@ -8693,13 +8538,7 @@
               <a:rPr lang="da-DK" sz="1400" b="1">
                 <a:latin typeface="Consolas" panose="020B0609020204030204" pitchFamily="49" charset="0"/>
               </a:rPr>
-              <a:t>cache.Add(c, </a:t>
-            </a:r>
-            <a:r>
-              <a:rPr lang="da-DK" sz="1400" b="1">
-                <a:latin typeface="Consolas" panose="020B0609020204030204" pitchFamily="49" charset="0"/>
-              </a:rPr>
-              <a:t>result</a:t>
+              <a:t>cache.Add(c, result</a:t>
             </a:r>
             <a:r>
               <a:rPr lang="da-DK" sz="1400" b="1" smtClean="0">
@@ -9193,13 +9032,7 @@
               <a:rPr lang="da-DK" sz="1600" b="1">
                 <a:latin typeface="Consolas" panose="020B0609020204030204" pitchFamily="49" charset="0"/>
               </a:rPr>
-              <a:t> </a:t>
-            </a:r>
-            <a:r>
-              <a:rPr lang="da-DK" sz="1600" b="1">
-                <a:latin typeface="Consolas" panose="020B0609020204030204" pitchFamily="49" charset="0"/>
-              </a:rPr>
-              <a:t>subject</a:t>
+              <a:t> subject</a:t>
             </a:r>
             <a:r>
               <a:rPr lang="da-DK" sz="1600" b="1" smtClean="0">
@@ -9233,13 +9066,7 @@
               <a:rPr lang="da-DK" sz="1600" b="1">
                 <a:latin typeface="Consolas" panose="020B0609020204030204" pitchFamily="49" charset="0"/>
               </a:rPr>
-              <a:t>subject </a:t>
-            </a:r>
-            <a:r>
-              <a:rPr lang="da-DK" sz="1600" b="1">
-                <a:latin typeface="Consolas" panose="020B0609020204030204" pitchFamily="49" charset="0"/>
-              </a:rPr>
-              <a:t>= </a:t>
+              <a:t>subject = </a:t>
             </a:r>
             <a:r>
               <a:rPr lang="da-DK" sz="1600" b="1" smtClean="0">
@@ -9281,16 +9108,7 @@
                 </a:solidFill>
                 <a:latin typeface="Consolas" panose="020B0609020204030204" pitchFamily="49" charset="0"/>
               </a:rPr>
-              <a:t>public </a:t>
-            </a:r>
-            <a:r>
-              <a:rPr lang="da-DK" sz="1600" b="1">
-                <a:solidFill>
-                  <a:srgbClr val="0070C0"/>
-                </a:solidFill>
-                <a:latin typeface="Consolas" panose="020B0609020204030204" pitchFamily="49" charset="0"/>
-              </a:rPr>
-              <a:t>int </a:t>
+              <a:t>public int </a:t>
             </a:r>
             <a:r>
               <a:rPr lang="da-DK" sz="1600" b="1">
@@ -9313,13 +9131,7 @@
               <a:rPr lang="da-DK" sz="1600" b="1">
                 <a:latin typeface="Consolas" panose="020B0609020204030204" pitchFamily="49" charset="0"/>
               </a:rPr>
-              <a:t> </a:t>
-            </a:r>
-            <a:r>
-              <a:rPr lang="da-DK" sz="1600" b="1">
-                <a:latin typeface="Consolas" panose="020B0609020204030204" pitchFamily="49" charset="0"/>
-              </a:rPr>
-              <a:t>c</a:t>
+              <a:t> c</a:t>
             </a:r>
             <a:r>
               <a:rPr lang="da-DK" sz="1600" b="1" smtClean="0">
@@ -9426,13 +9238,7 @@
               <a:rPr lang="da-DK" sz="1600" b="1">
                 <a:latin typeface="Consolas" panose="020B0609020204030204" pitchFamily="49" charset="0"/>
               </a:rPr>
-              <a:t>_</a:t>
-            </a:r>
-            <a:r>
-              <a:rPr lang="da-DK" sz="1600" b="1">
-                <a:latin typeface="Consolas" panose="020B0609020204030204" pitchFamily="49" charset="0"/>
-              </a:rPr>
-              <a:t>subject.Calculate(c</a:t>
+              <a:t>_subject.Calculate(c</a:t>
             </a:r>
             <a:r>
               <a:rPr lang="da-DK" sz="1600" b="1" smtClean="0">
@@ -9919,13 +9725,7 @@
               <a:rPr lang="da-DK" b="1">
                 <a:latin typeface="Consolas" panose="020B0609020204030204" pitchFamily="49" charset="0"/>
               </a:rPr>
-              <a:t> _</a:t>
-            </a:r>
-            <a:r>
-              <a:rPr lang="da-DK" b="1">
-                <a:latin typeface="Consolas" panose="020B0609020204030204" pitchFamily="49" charset="0"/>
-              </a:rPr>
-              <a:t>subject</a:t>
+              <a:t> _subject</a:t>
             </a:r>
             <a:r>
               <a:rPr lang="da-DK" b="1" smtClean="0">
@@ -10057,13 +9857,7 @@
               <a:rPr lang="da-DK" b="1">
                 <a:latin typeface="Consolas" panose="020B0609020204030204" pitchFamily="49" charset="0"/>
               </a:rPr>
-              <a:t>subject = </a:t>
-            </a:r>
-            <a:r>
-              <a:rPr lang="da-DK" b="1">
-                <a:latin typeface="Consolas" panose="020B0609020204030204" pitchFamily="49" charset="0"/>
-              </a:rPr>
-              <a:t>subject</a:t>
+              <a:t>subject = subject</a:t>
             </a:r>
             <a:r>
               <a:rPr lang="da-DK" b="1" smtClean="0">
@@ -10113,16 +9907,7 @@
                 </a:solidFill>
                 <a:latin typeface="Consolas" panose="020B0609020204030204" pitchFamily="49" charset="0"/>
               </a:rPr>
-              <a:t>public </a:t>
-            </a:r>
-            <a:r>
-              <a:rPr lang="da-DK" b="1">
-                <a:solidFill>
-                  <a:srgbClr val="0070C0"/>
-                </a:solidFill>
-                <a:latin typeface="Consolas" panose="020B0609020204030204" pitchFamily="49" charset="0"/>
-              </a:rPr>
-              <a:t>int </a:t>
+              <a:t>public int </a:t>
             </a:r>
             <a:r>
               <a:rPr lang="da-DK" b="1">
@@ -10145,13 +9930,7 @@
               <a:rPr lang="da-DK" b="1">
                 <a:latin typeface="Consolas" panose="020B0609020204030204" pitchFamily="49" charset="0"/>
               </a:rPr>
-              <a:t> </a:t>
-            </a:r>
-            <a:r>
-              <a:rPr lang="da-DK" b="1">
-                <a:latin typeface="Consolas" panose="020B0609020204030204" pitchFamily="49" charset="0"/>
-              </a:rPr>
-              <a:t>c</a:t>
+              <a:t> c</a:t>
             </a:r>
             <a:r>
               <a:rPr lang="da-DK" b="1" smtClean="0">
@@ -10530,17 +10309,12 @@
             <a:pPr lvl="1"/>
             <a:r>
               <a:rPr lang="da-DK" sz="2800" smtClean="0"/>
-              <a:t>We want to use the </a:t>
-            </a:r>
-            <a:r>
-              <a:rPr lang="da-DK" sz="2800" smtClean="0"/>
-              <a:t>functionality offered by a class </a:t>
+              <a:t>We want to use the functionality offered by a class </a:t>
             </a:r>
             <a:r>
               <a:rPr lang="da-DK" sz="2800" b="1" smtClean="0"/>
               <a:t>Subject</a:t>
             </a:r>
-            <a:endParaRPr lang="da-DK" sz="2800" b="1" smtClean="0"/>
           </a:p>
           <a:p>
             <a:pPr lvl="1"/>
@@ -10565,15 +10339,7 @@
                   <a:srgbClr val="FF0000"/>
                 </a:solidFill>
               </a:rPr>
-              <a:t>How to </a:t>
-            </a:r>
-            <a:r>
-              <a:rPr lang="da-DK" sz="3200" b="1" i="1" smtClean="0">
-                <a:solidFill>
-                  <a:srgbClr val="FF0000"/>
-                </a:solidFill>
-              </a:rPr>
-              <a:t>offer the services of Subject, but also implement management of restrictions in a transparent way.</a:t>
+              <a:t>How to offer the services of Subject, but also implement management of restrictions in a transparent way.</a:t>
             </a:r>
             <a:endParaRPr lang="da-DK" sz="3200" b="1" i="1">
               <a:solidFill>
@@ -10628,7 +10394,6 @@
               <a:rPr lang="da-DK" sz="4800" smtClean="0"/>
               <a:t>Client</a:t>
             </a:r>
-            <a:endParaRPr lang="da-DK" sz="4800" smtClean="0"/>
           </a:p>
         </p:txBody>
       </p:sp>
@@ -10675,7 +10440,6 @@
               <a:rPr lang="da-DK" sz="4800" smtClean="0"/>
               <a:t>Subject</a:t>
             </a:r>
-            <a:endParaRPr lang="da-DK" sz="4800" smtClean="0"/>
           </a:p>
         </p:txBody>
       </p:sp>
@@ -10724,7 +10488,6 @@
               <a:rPr lang="da-DK" sz="4800" smtClean="0"/>
               <a:t>Proxy</a:t>
             </a:r>
-            <a:endParaRPr lang="da-DK" sz="4800" smtClean="0"/>
           </a:p>
         </p:txBody>
       </p:sp>
@@ -10818,13 +10581,13 @@
   <p:clrMapOvr>
     <a:masterClrMapping/>
   </p:clrMapOvr>
-  <mc:AlternateContent xmlns:mc="http://schemas.openxmlformats.org/markup-compatibility/2006">
-    <mc:Choice xmlns:p14="http://schemas.microsoft.com/office/powerpoint/2010/main" Requires="p14">
+  <mc:AlternateContent xmlns:mc="http://schemas.openxmlformats.org/markup-compatibility/2006" xmlns:p14="http://schemas.microsoft.com/office/powerpoint/2010/main">
+    <mc:Choice Requires="p14">
       <p:transition spd="med" p14:dur="700">
         <p:fade/>
       </p:transition>
     </mc:Choice>
-    <mc:Fallback>
+    <mc:Fallback xmlns="">
       <p:transition spd="med">
         <p:fade/>
       </p:transition>
@@ -11463,7 +11226,6 @@
               <a:rPr lang="da-DK" sz="3600" smtClean="0"/>
               <a:t>Subject</a:t>
             </a:r>
-            <a:endParaRPr lang="da-DK" sz="3600" smtClean="0"/>
           </a:p>
         </p:txBody>
       </p:sp>
@@ -11640,7 +11402,6 @@
               <a:rPr lang="da-DK" sz="3600" smtClean="0"/>
               <a:t>Subject</a:t>
             </a:r>
-            <a:endParaRPr lang="da-DK" sz="3600" smtClean="0"/>
           </a:p>
         </p:txBody>
       </p:sp>
@@ -11693,11 +11454,6 @@
               </a:rPr>
               <a:t>ISubject</a:t>
             </a:r>
-            <a:endParaRPr lang="da-DK" sz="3600" smtClean="0">
-              <a:solidFill>
-                <a:srgbClr val="FFFF00"/>
-              </a:solidFill>
-            </a:endParaRPr>
           </a:p>
         </p:txBody>
       </p:sp>
@@ -11751,13 +11507,13 @@
   <p:clrMapOvr>
     <a:masterClrMapping/>
   </p:clrMapOvr>
-  <mc:AlternateContent xmlns:mc="http://schemas.openxmlformats.org/markup-compatibility/2006">
-    <mc:Choice xmlns:p14="http://schemas.microsoft.com/office/powerpoint/2010/main" Requires="p14">
+  <mc:AlternateContent xmlns:mc="http://schemas.openxmlformats.org/markup-compatibility/2006" xmlns:p14="http://schemas.microsoft.com/office/powerpoint/2010/main">
+    <mc:Choice Requires="p14">
       <p:transition spd="med" p14:dur="700">
         <p:fade/>
       </p:transition>
     </mc:Choice>
-    <mc:Fallback>
+    <mc:Fallback xmlns="">
       <p:transition spd="med">
         <p:fade/>
       </p:transition>
@@ -12014,13 +11770,7 @@
               <a:rPr lang="da-DK" sz="2400" b="1">
                 <a:latin typeface="Consolas" panose="020B0609020204030204" pitchFamily="49" charset="0"/>
               </a:rPr>
-              <a:t> </a:t>
-            </a:r>
-            <a:r>
-              <a:rPr lang="da-DK" sz="2400" b="1">
-                <a:latin typeface="Consolas" panose="020B0609020204030204" pitchFamily="49" charset="0"/>
-              </a:rPr>
-              <a:t>: </a:t>
+              <a:t> : </a:t>
             </a:r>
             <a:r>
               <a:rPr lang="da-DK" sz="2400" b="1">
@@ -12145,18 +11895,7 @@
                 </a:solidFill>
                 <a:latin typeface="Consolas" panose="020B0609020204030204" pitchFamily="49" charset="0"/>
               </a:rPr>
-              <a:t>// </a:t>
-            </a:r>
-            <a:r>
-              <a:rPr lang="da-DK" sz="2400" b="1">
-                <a:solidFill>
-                  <a:schemeClr val="accent6">
-                    <a:lumMod val="75000"/>
-                  </a:schemeClr>
-                </a:solidFill>
-                <a:latin typeface="Consolas" panose="020B0609020204030204" pitchFamily="49" charset="0"/>
-              </a:rPr>
-              <a:t>Code for calculation</a:t>
+              <a:t>// Code for calculation</a:t>
             </a:r>
           </a:p>
           <a:p>
@@ -12417,13 +12156,7 @@
               <a:rPr lang="da-DK" sz="2400" b="1">
                 <a:latin typeface="Consolas" panose="020B0609020204030204" pitchFamily="49" charset="0"/>
               </a:rPr>
-              <a:t>result = </a:t>
-            </a:r>
-            <a:r>
-              <a:rPr lang="da-DK" sz="2400" b="1">
-                <a:latin typeface="Consolas" panose="020B0609020204030204" pitchFamily="49" charset="0"/>
-              </a:rPr>
-              <a:t>subject.Calculate(c</a:t>
+              <a:t>result = subject.Calculate(c</a:t>
             </a:r>
             <a:r>
               <a:rPr lang="da-DK" sz="2400" b="1" smtClean="0">

</xml_diff>